<commit_message>
updated readme and .gitignore
</commit_message>
<xml_diff>
--- a/project_presentation_241021/StockEcom-Presentation-241021.pptx
+++ b/project_presentation_241021/StockEcom-Presentation-241021.pptx
@@ -6359,7 +6359,7 @@
           <a:p>
             <a:fld id="{2395C5C9-164C-46B3-A87E-7660D39D3106}" type="datetime2">
               <a:rPr lang="en-US" smtClean="0"/>
-              <a:t>Monday, 21 October, 2024</a:t>
+              <a:t>Monday, October 21, 2024</a:t>
             </a:fld>
             <a:endParaRPr lang="en-US" dirty="0"/>
           </a:p>
@@ -6562,7 +6562,7 @@
           <a:p>
             <a:fld id="{5B75179A-1E2B-41AB-B400-4F1B4022FAEE}" type="datetime2">
               <a:rPr lang="en-US" smtClean="0"/>
-              <a:t>Monday, 21 October, 2024</a:t>
+              <a:t>Monday, October 21, 2024</a:t>
             </a:fld>
             <a:endParaRPr lang="en-US"/>
           </a:p>
@@ -6775,7 +6775,7 @@
           <a:p>
             <a:fld id="{05681D0F-6595-4F14-8EF3-954CD87C797B}" type="datetime2">
               <a:rPr lang="en-US" smtClean="0"/>
-              <a:t>Monday, 21 October, 2024</a:t>
+              <a:t>Monday, October 21, 2024</a:t>
             </a:fld>
             <a:endParaRPr lang="en-US"/>
           </a:p>
@@ -6977,7 +6977,7 @@
           <a:p>
             <a:fld id="{4DDCFF8A-AAF8-4A12-8A91-9CA0EAF6CBB9}" type="datetime2">
               <a:rPr lang="en-US" smtClean="0"/>
-              <a:t>Monday, 21 October, 2024</a:t>
+              <a:t>Monday, October 21, 2024</a:t>
             </a:fld>
             <a:endParaRPr lang="en-US" dirty="0"/>
           </a:p>
@@ -7256,7 +7256,7 @@
           <a:p>
             <a:fld id="{ABCC25C3-021A-4B0B-8F70-0C181FE1CF45}" type="datetime2">
               <a:rPr lang="en-US" smtClean="0"/>
-              <a:t>Monday, 21 October, 2024</a:t>
+              <a:t>Monday, October 21, 2024</a:t>
             </a:fld>
             <a:endParaRPr lang="en-US"/>
           </a:p>
@@ -7516,7 +7516,7 @@
           <a:p>
             <a:fld id="{0C23D88D-8CEC-4ED9-A53B-5596187D9A16}" type="datetime2">
               <a:rPr lang="en-US" smtClean="0"/>
-              <a:t>Monday, 21 October, 2024</a:t>
+              <a:t>Monday, October 21, 2024</a:t>
             </a:fld>
             <a:endParaRPr lang="en-US"/>
           </a:p>
@@ -7932,7 +7932,7 @@
           <a:p>
             <a:fld id="{D2CCD382-DFDA-4722-A27A-59C21AD112F2}" type="datetime2">
               <a:rPr lang="en-US" smtClean="0"/>
-              <a:t>Monday, 21 October, 2024</a:t>
+              <a:t>Monday, October 21, 2024</a:t>
             </a:fld>
             <a:endParaRPr lang="en-US"/>
           </a:p>
@@ -8077,7 +8077,7 @@
           <a:p>
             <a:fld id="{22F2A30D-1C09-413F-AAB1-38F366000715}" type="datetime2">
               <a:rPr lang="en-US" smtClean="0"/>
-              <a:t>Monday, 21 October, 2024</a:t>
+              <a:t>Monday, October 21, 2024</a:t>
             </a:fld>
             <a:endParaRPr lang="en-US"/>
           </a:p>
@@ -8199,7 +8199,7 @@
           <a:p>
             <a:fld id="{6DB82B9C-D65E-4F64-95C3-B10F3B00F0D9}" type="datetime2">
               <a:rPr lang="en-US" smtClean="0"/>
-              <a:t>Monday, 21 October, 2024</a:t>
+              <a:t>Monday, October 21, 2024</a:t>
             </a:fld>
             <a:endParaRPr lang="en-US"/>
           </a:p>
@@ -8522,7 +8522,7 @@
           <a:p>
             <a:fld id="{B7F5FDCC-6AAC-4A08-B9E0-3793AB5E64C3}" type="datetime2">
               <a:rPr lang="en-US" smtClean="0"/>
-              <a:t>Monday, 21 October, 2024</a:t>
+              <a:t>Monday, October 21, 2024</a:t>
             </a:fld>
             <a:endParaRPr lang="en-US"/>
           </a:p>
@@ -8810,7 +8810,7 @@
           <a:p>
             <a:fld id="{349FE94D-439C-40F1-900E-BC07940E3988}" type="datetime2">
               <a:rPr lang="en-US" smtClean="0"/>
-              <a:t>Monday, 21 October, 2024</a:t>
+              <a:t>Monday, October 21, 2024</a:t>
             </a:fld>
             <a:endParaRPr lang="en-US"/>
           </a:p>
@@ -9098,7 +9098,7 @@
           <a:p>
             <a:fld id="{8DEA2CF1-0EB2-4673-802D-3371233E4A77}" type="datetime2">
               <a:rPr lang="en-US" smtClean="0"/>
-              <a:t>Monday, 21 October, 2024</a:t>
+              <a:t>Monday, October 21, 2024</a:t>
             </a:fld>
             <a:endParaRPr lang="en-US" dirty="0"/>
           </a:p>
@@ -9727,6 +9727,12 @@
                 <a:ln>
                   <a:noFill/>
                 </a:ln>
+                <a:solidFill>
+                  <a:schemeClr val="tx1">
+                    <a:lumMod val="95000"/>
+                    <a:alpha val="58000"/>
+                  </a:schemeClr>
+                </a:solidFill>
                 <a:effectLst/>
                 <a:latin typeface="+mj-lt"/>
               </a:rPr>
@@ -9755,6 +9761,12 @@
                 <a:ln>
                   <a:noFill/>
                 </a:ln>
+                <a:solidFill>
+                  <a:schemeClr val="tx1">
+                    <a:lumMod val="95000"/>
+                    <a:alpha val="58000"/>
+                  </a:schemeClr>
+                </a:solidFill>
                 <a:effectLst/>
                 <a:latin typeface="+mj-lt"/>
               </a:rPr>
@@ -9781,6 +9793,12 @@
                 <a:ln>
                   <a:noFill/>
                 </a:ln>
+                <a:solidFill>
+                  <a:schemeClr val="tx1">
+                    <a:lumMod val="95000"/>
+                    <a:alpha val="58000"/>
+                  </a:schemeClr>
+                </a:solidFill>
                 <a:effectLst/>
                 <a:latin typeface="+mj-lt"/>
               </a:rPr>
@@ -9791,6 +9809,12 @@
                 <a:ln>
                   <a:noFill/>
                 </a:ln>
+                <a:solidFill>
+                  <a:schemeClr val="tx1">
+                    <a:lumMod val="95000"/>
+                    <a:alpha val="58000"/>
+                  </a:schemeClr>
+                </a:solidFill>
                 <a:effectLst/>
                 <a:latin typeface="+mj-lt"/>
               </a:rPr>
@@ -9819,10 +9843,26 @@
                 <a:ln>
                   <a:noFill/>
                 </a:ln>
+                <a:solidFill>
+                  <a:schemeClr val="tx1">
+                    <a:lumMod val="95000"/>
+                    <a:alpha val="58000"/>
+                  </a:schemeClr>
+                </a:solidFill>
                 <a:effectLst/>
                 <a:latin typeface="+mj-lt"/>
               </a:rPr>
-              <a:t>The application includes a dynamic product catalog, a secure checkout system with PayPal integration, state management using Redux, and API communication via Axios.</a:t>
+              <a:t>The application includes a dynamic product catalog, a secure checkout system with PayPal integration, state management using Redux, and API communication via Axios</a:t>
+            </a:r>
+            <a:r>
+              <a:rPr kumimoji="0" lang="LID4096" altLang="LID4096" sz="2400" b="0" i="0" u="none" strike="noStrike" cap="none" normalizeH="0" baseline="0" dirty="0">
+                <a:ln>
+                  <a:noFill/>
+                </a:ln>
+                <a:effectLst/>
+                <a:latin typeface="+mj-lt"/>
+              </a:rPr>
+              <a:t>.</a:t>
             </a:r>
           </a:p>
           <a:p>
@@ -10501,6 +10541,55 @@
             <a:endParaRPr lang="LID4096" sz="2400" dirty="0">
               <a:latin typeface="+mj-lt"/>
             </a:endParaRPr>
+          </a:p>
+        </p:txBody>
+      </p:sp>
+      <p:sp>
+        <p:nvSpPr>
+          <p:cNvPr id="5" name="TextBox 4">
+            <a:extLst>
+              <a:ext uri="{FF2B5EF4-FFF2-40B4-BE49-F238E27FC236}">
+                <a16:creationId xmlns:a16="http://schemas.microsoft.com/office/drawing/2014/main" id="{91FB9366-B18E-C6D6-8070-AC683F42EC21}"/>
+              </a:ext>
+            </a:extLst>
+          </p:cNvPr>
+          <p:cNvSpPr txBox="1"/>
+          <p:nvPr/>
+        </p:nvSpPr>
+        <p:spPr>
+          <a:xfrm>
+            <a:off x="6558115" y="5978013"/>
+            <a:ext cx="2615381" cy="461665"/>
+          </a:xfrm>
+          <a:prstGeom prst="rect">
+            <a:avLst/>
+          </a:prstGeom>
+          <a:noFill/>
+        </p:spPr>
+        <p:txBody>
+          <a:bodyPr wrap="square" rtlCol="0">
+            <a:spAutoFit/>
+          </a:bodyPr>
+          <a:lstStyle/>
+          <a:p>
+            <a:r>
+              <a:rPr lang="en-US" sz="2400" dirty="0">
+                <a:latin typeface="+mj-lt"/>
+              </a:rPr>
+              <a:t>Nick </a:t>
+            </a:r>
+            <a:r>
+              <a:rPr lang="en-US" sz="2400" dirty="0" err="1">
+                <a:latin typeface="+mj-lt"/>
+              </a:rPr>
+              <a:t>Bwalley</a:t>
+            </a:r>
+            <a:r>
+              <a:rPr lang="en-US" sz="2400" dirty="0">
+                <a:latin typeface="+mj-lt"/>
+              </a:rPr>
+              <a:t>, Jainick Vishani</a:t>
+            </a:r>
           </a:p>
         </p:txBody>
       </p:sp>

</xml_diff>